<commit_message>
Inserção de 2 tópicos sobre o desafio
Sobre escalabilidade e novos layouts.
</commit_message>
<xml_diff>
--- a/TesteUppertools - Documentos/Apresentação da Solução.pptx
+++ b/TesteUppertools - Documentos/Apresentação da Solução.pptx
@@ -9,6 +9,8 @@
     <p:sldId id="257" r:id="rId3"/>
     <p:sldId id="258" r:id="rId4"/>
     <p:sldId id="259" r:id="rId5"/>
+    <p:sldId id="260" r:id="rId6"/>
+    <p:sldId id="261" r:id="rId7"/>
   </p:sldIdLst>
   <p:sldSz cx="12192000" cy="6858000"/>
   <p:notesSz cx="6858000" cy="9144000"/>
@@ -107,6 +109,11 @@
       </a:defRPr>
     </a:lvl9pPr>
   </p:defaultTextStyle>
+  <p:extLst>
+    <p:ext uri="{EFAFB233-063F-42B5-8137-9DF3F51BA10A}">
+      <p15:sldGuideLst xmlns:p15="http://schemas.microsoft.com/office/powerpoint/2012/main"/>
+    </p:ext>
+  </p:extLst>
 </p:presentation>
 </file>
 
@@ -3347,13 +3354,8 @@
           <a:p>
             <a:r>
               <a:rPr lang="pt-BR" b="1" dirty="0"/>
-              <a:t>Teste </a:t>
-            </a:r>
-            <a:r>
-              <a:rPr lang="pt-BR" b="1" dirty="0" err="1"/>
-              <a:t>Uppertools</a:t>
-            </a:r>
-            <a:endParaRPr lang="pt-BR" b="1" dirty="0"/>
+              <a:t>Teste Uppertools</a:t>
+            </a:r>
           </a:p>
         </p:txBody>
       </p:sp>
@@ -3442,12 +3444,8 @@
           <a:lstStyle/>
           <a:p>
             <a:r>
-              <a:rPr lang="pt-BR" b="1" dirty="0" err="1"/>
-              <a:t>Worker</a:t>
-            </a:r>
-            <a:r>
               <a:rPr lang="pt-BR" b="1" dirty="0"/>
-              <a:t> importador de e-mail</a:t>
+              <a:t>Worker importador de e-mail</a:t>
             </a:r>
           </a:p>
         </p:txBody>
@@ -3515,15 +3513,7 @@
             </a:pPr>
             <a:r>
               <a:rPr lang="pt-BR" dirty="0"/>
-              <a:t>Após a execução o </a:t>
-            </a:r>
-            <a:r>
-              <a:rPr lang="pt-BR" dirty="0" err="1"/>
-              <a:t>worker</a:t>
-            </a:r>
-            <a:r>
-              <a:rPr lang="pt-BR" dirty="0"/>
-              <a:t> responsável por realizar o download das faturas irá apresentar mensagens sobre sua execução após um </a:t>
+              <a:t>Após a execução o Worker responsável por realizar o download das faturas irá apresentar mensagens sobre sua execução após um </a:t>
             </a:r>
             <a:r>
               <a:rPr lang="pt-BR" dirty="0" err="1"/>
@@ -3541,15 +3531,7 @@
             </a:pPr>
             <a:r>
               <a:rPr lang="pt-BR" dirty="0"/>
-              <a:t>A camada de e-mail está implementada mas o </a:t>
-            </a:r>
-            <a:r>
-              <a:rPr lang="pt-BR" dirty="0" err="1"/>
-              <a:t>worker</a:t>
-            </a:r>
-            <a:r>
-              <a:rPr lang="pt-BR" dirty="0"/>
-              <a:t> não está e irá retornar “Nenhum e-mail recebido” sempre.</a:t>
+              <a:t>A camada de e-mail está implementada mas o Worker não está e irá retornar “Nenhum e-mail recebido” sempre.</a:t>
             </a:r>
           </a:p>
         </p:txBody>
@@ -3606,12 +3588,8 @@
           <a:lstStyle/>
           <a:p>
             <a:r>
-              <a:rPr lang="pt-BR" b="1" dirty="0" err="1"/>
-              <a:t>Worker</a:t>
-            </a:r>
-            <a:r>
               <a:rPr lang="pt-BR" b="1" dirty="0"/>
-              <a:t> formatador de arquivos</a:t>
+              <a:t>Worker formatador de arquivos</a:t>
             </a:r>
           </a:p>
         </p:txBody>
@@ -3815,12 +3793,8 @@
           <a:lstStyle/>
           <a:p>
             <a:r>
-              <a:rPr lang="pt-BR" b="1" dirty="0" err="1"/>
-              <a:t>Worker</a:t>
-            </a:r>
-            <a:r>
               <a:rPr lang="pt-BR" b="1" dirty="0"/>
-              <a:t> interpretador de arquivos</a:t>
+              <a:t>Worker interpretador de arquivos</a:t>
             </a:r>
           </a:p>
         </p:txBody>
@@ -3963,6 +3937,190 @@
     <p:extLst>
       <p:ext uri="{BB962C8B-B14F-4D97-AF65-F5344CB8AC3E}">
         <p14:creationId xmlns:p14="http://schemas.microsoft.com/office/powerpoint/2010/main" val="1261984905"/>
+      </p:ext>
+    </p:extLst>
+  </p:cSld>
+  <p:clrMapOvr>
+    <a:masterClrMapping/>
+  </p:clrMapOvr>
+</p:sld>
+</file>
+
+<file path=ppt/slides/slide5.xml><?xml version="1.0" encoding="utf-8"?>
+<p:sld xmlns:a="http://schemas.openxmlformats.org/drawingml/2006/main" xmlns:r="http://schemas.openxmlformats.org/officeDocument/2006/relationships" xmlns:p="http://schemas.openxmlformats.org/presentationml/2006/main">
+  <p:cSld>
+    <p:spTree>
+      <p:nvGrpSpPr>
+        <p:cNvPr id="1" name=""/>
+        <p:cNvGrpSpPr/>
+        <p:nvPr/>
+      </p:nvGrpSpPr>
+      <p:grpSpPr>
+        <a:xfrm>
+          <a:off x="0" y="0"/>
+          <a:ext cx="0" cy="0"/>
+          <a:chOff x="0" y="0"/>
+          <a:chExt cx="0" cy="0"/>
+        </a:xfrm>
+      </p:grpSpPr>
+      <p:sp>
+        <p:nvSpPr>
+          <p:cNvPr id="2" name="Título 1">
+            <a:extLst>
+              <a:ext uri="{FF2B5EF4-FFF2-40B4-BE49-F238E27FC236}">
+                <a16:creationId xmlns:a16="http://schemas.microsoft.com/office/drawing/2014/main" id="{8B75C77C-BC31-4F4A-8B84-27887C9B0681}"/>
+              </a:ext>
+            </a:extLst>
+          </p:cNvPr>
+          <p:cNvSpPr>
+            <a:spLocks noGrp="1"/>
+          </p:cNvSpPr>
+          <p:nvPr>
+            <p:ph type="title"/>
+          </p:nvPr>
+        </p:nvSpPr>
+        <p:spPr/>
+        <p:txBody>
+          <a:bodyPr/>
+          <a:lstStyle/>
+          <a:p>
+            <a:r>
+              <a:rPr lang="pt-BR" dirty="0"/>
+              <a:t>Escalabilidade</a:t>
+            </a:r>
+          </a:p>
+        </p:txBody>
+      </p:sp>
+      <p:sp>
+        <p:nvSpPr>
+          <p:cNvPr id="3" name="Espaço Reservado para Conteúdo 2">
+            <a:extLst>
+              <a:ext uri="{FF2B5EF4-FFF2-40B4-BE49-F238E27FC236}">
+                <a16:creationId xmlns:a16="http://schemas.microsoft.com/office/drawing/2014/main" id="{B60914DA-49E3-4F9F-8994-018712CAC1DF}"/>
+              </a:ext>
+            </a:extLst>
+          </p:cNvPr>
+          <p:cNvSpPr>
+            <a:spLocks noGrp="1"/>
+          </p:cNvSpPr>
+          <p:nvPr>
+            <p:ph idx="1"/>
+          </p:nvPr>
+        </p:nvSpPr>
+        <p:spPr/>
+        <p:txBody>
+          <a:bodyPr/>
+          <a:lstStyle/>
+          <a:p>
+            <a:r>
+              <a:rPr lang="pt-BR" dirty="0"/>
+              <a:t>Para ganho de performance, cada processo foi dividido em um background service específico, utilizado um recursos externos isolados (e-mail, banco de dados, componentes de terceiros e etc...).</a:t>
+            </a:r>
+          </a:p>
+          <a:p>
+            <a:r>
+              <a:rPr lang="pt-BR" dirty="0"/>
+              <a:t>Cada Worker pode ser instanciado mais de uma vez, aumentando a capacidade de processamento em determinada funcionalidade em caso de sobrecarga.</a:t>
+            </a:r>
+          </a:p>
+        </p:txBody>
+      </p:sp>
+    </p:spTree>
+    <p:extLst>
+      <p:ext uri="{BB962C8B-B14F-4D97-AF65-F5344CB8AC3E}">
+        <p14:creationId xmlns:p14="http://schemas.microsoft.com/office/powerpoint/2010/main" val="2778229877"/>
+      </p:ext>
+    </p:extLst>
+  </p:cSld>
+  <p:clrMapOvr>
+    <a:masterClrMapping/>
+  </p:clrMapOvr>
+</p:sld>
+</file>
+
+<file path=ppt/slides/slide6.xml><?xml version="1.0" encoding="utf-8"?>
+<p:sld xmlns:a="http://schemas.openxmlformats.org/drawingml/2006/main" xmlns:r="http://schemas.openxmlformats.org/officeDocument/2006/relationships" xmlns:p="http://schemas.openxmlformats.org/presentationml/2006/main">
+  <p:cSld>
+    <p:spTree>
+      <p:nvGrpSpPr>
+        <p:cNvPr id="1" name=""/>
+        <p:cNvGrpSpPr/>
+        <p:nvPr/>
+      </p:nvGrpSpPr>
+      <p:grpSpPr>
+        <a:xfrm>
+          <a:off x="0" y="0"/>
+          <a:ext cx="0" cy="0"/>
+          <a:chOff x="0" y="0"/>
+          <a:chExt cx="0" cy="0"/>
+        </a:xfrm>
+      </p:grpSpPr>
+      <p:sp>
+        <p:nvSpPr>
+          <p:cNvPr id="2" name="Título 1">
+            <a:extLst>
+              <a:ext uri="{FF2B5EF4-FFF2-40B4-BE49-F238E27FC236}">
+                <a16:creationId xmlns:a16="http://schemas.microsoft.com/office/drawing/2014/main" id="{CD22978C-8656-475D-9FA3-AA6C6DA5EE19}"/>
+              </a:ext>
+            </a:extLst>
+          </p:cNvPr>
+          <p:cNvSpPr>
+            <a:spLocks noGrp="1"/>
+          </p:cNvSpPr>
+          <p:nvPr>
+            <p:ph type="title"/>
+          </p:nvPr>
+        </p:nvSpPr>
+        <p:spPr/>
+        <p:txBody>
+          <a:bodyPr/>
+          <a:lstStyle/>
+          <a:p>
+            <a:r>
+              <a:rPr lang="pt-BR" dirty="0"/>
+              <a:t>Inserção de Novos Layouts de Arquivo</a:t>
+            </a:r>
+          </a:p>
+        </p:txBody>
+      </p:sp>
+      <p:sp>
+        <p:nvSpPr>
+          <p:cNvPr id="3" name="Espaço Reservado para Conteúdo 2">
+            <a:extLst>
+              <a:ext uri="{FF2B5EF4-FFF2-40B4-BE49-F238E27FC236}">
+                <a16:creationId xmlns:a16="http://schemas.microsoft.com/office/drawing/2014/main" id="{B9E35539-AE0F-4497-9109-C3D388499862}"/>
+              </a:ext>
+            </a:extLst>
+          </p:cNvPr>
+          <p:cNvSpPr>
+            <a:spLocks noGrp="1"/>
+          </p:cNvSpPr>
+          <p:nvPr>
+            <p:ph idx="1"/>
+          </p:nvPr>
+        </p:nvSpPr>
+        <p:spPr/>
+        <p:txBody>
+          <a:bodyPr/>
+          <a:lstStyle/>
+          <a:p>
+            <a:r>
+              <a:rPr lang="pt-BR" dirty="0"/>
+              <a:t>Para facilitar ao máximo a inserção de layouts foi pensando o cadastro e a generalização nos arquivos, podendo ser inserido um novo padrão para cada cliente sem ter a necessidade de manutenção no código.</a:t>
+            </a:r>
+          </a:p>
+          <a:p>
+            <a:r>
+              <a:rPr lang="pt-BR" dirty="0"/>
+              <a:t>Foram criadas classes específicas para armazenar e interpretar cada layout, direcionando a responsabilidade e facilitando a manutenção.</a:t>
+            </a:r>
+          </a:p>
+        </p:txBody>
+      </p:sp>
+    </p:spTree>
+    <p:extLst>
+      <p:ext uri="{BB962C8B-B14F-4D97-AF65-F5344CB8AC3E}">
+        <p14:creationId xmlns:p14="http://schemas.microsoft.com/office/powerpoint/2010/main" val="1368713895"/>
       </p:ext>
     </p:extLst>
   </p:cSld>

</xml_diff>